<commit_message>
Add web analytic project
</commit_message>
<xml_diff>
--- a/src/assetts/icons/Icons.pptx
+++ b/src/assetts/icons/Icons.pptx
@@ -6,6 +6,7 @@
   </p:sldMasterIdLst>
   <p:sldIdLst>
     <p:sldId id="256" r:id="rId2"/>
+    <p:sldId id="258" r:id="rId3"/>
   </p:sldIdLst>
   <p:sldSz cx="12192000" cy="6858000"/>
   <p:notesSz cx="6858000" cy="9144000"/>
@@ -104,7 +105,231 @@
       </a:defRPr>
     </a:lvl9pPr>
   </p:defaultTextStyle>
+  <p:extLst>
+    <p:ext uri="{EFAFB233-063F-42B5-8137-9DF3F51BA10A}">
+      <p15:sldGuideLst xmlns:p15="http://schemas.microsoft.com/office/powerpoint/2012/main"/>
+    </p:ext>
+  </p:extLst>
 </p:presentation>
+</file>
+
+<file path=ppt/revisionInfo.xml><?xml version="1.0" encoding="utf-8"?>
+<p1510:revInfo xmlns:a="http://schemas.openxmlformats.org/drawingml/2006/main" xmlns:r="http://schemas.openxmlformats.org/officeDocument/2006/relationships" xmlns:p1510="http://schemas.microsoft.com/office/powerpoint/2015/10/main">
+  <p1510:revLst>
+    <p1510:client id="{F1DF9500-FD0D-475C-AA9D-E6F4CFE884E5}" v="10" dt="2024-04-26T19:10:46.338"/>
+  </p1510:revLst>
+</p1510:revInfo>
+</file>
+
+<file path=ppt/changesInfos/changesInfo1.xml><?xml version="1.0" encoding="utf-8"?>
+<pc:chgInfo xmlns:a="http://schemas.openxmlformats.org/drawingml/2006/main" xmlns:r="http://schemas.openxmlformats.org/officeDocument/2006/relationships" xmlns:ac="http://schemas.microsoft.com/office/drawing/2013/main/command" xmlns:pc="http://schemas.microsoft.com/office/powerpoint/2013/main/command">
+  <pc:docChgLst>
+    <pc:chgData name="Widyanto, Hendry" userId="7bc02913-90f9-4354-b7d8-306a7ff96a5f" providerId="ADAL" clId="{F1DF9500-FD0D-475C-AA9D-E6F4CFE884E5}"/>
+    <pc:docChg chg="undo custSel addSld delSld modSld">
+      <pc:chgData name="Widyanto, Hendry" userId="7bc02913-90f9-4354-b7d8-306a7ff96a5f" providerId="ADAL" clId="{F1DF9500-FD0D-475C-AA9D-E6F4CFE884E5}" dt="2024-04-26T19:10:50.782" v="53" actId="1076"/>
+      <pc:docMkLst>
+        <pc:docMk/>
+      </pc:docMkLst>
+      <pc:sldChg chg="modSp mod">
+        <pc:chgData name="Widyanto, Hendry" userId="7bc02913-90f9-4354-b7d8-306a7ff96a5f" providerId="ADAL" clId="{F1DF9500-FD0D-475C-AA9D-E6F4CFE884E5}" dt="2024-04-26T18:59:56.668" v="3" actId="1076"/>
+        <pc:sldMkLst>
+          <pc:docMk/>
+          <pc:sldMk cId="4102408768" sldId="256"/>
+        </pc:sldMkLst>
+        <pc:picChg chg="mod">
+          <ac:chgData name="Widyanto, Hendry" userId="7bc02913-90f9-4354-b7d8-306a7ff96a5f" providerId="ADAL" clId="{F1DF9500-FD0D-475C-AA9D-E6F4CFE884E5}" dt="2024-04-26T18:59:56.668" v="3" actId="1076"/>
+          <ac:picMkLst>
+            <pc:docMk/>
+            <pc:sldMk cId="4102408768" sldId="256"/>
+            <ac:picMk id="27" creationId="{5E9C174F-941F-0ABA-7B4D-02C1B089B704}"/>
+          </ac:picMkLst>
+        </pc:picChg>
+      </pc:sldChg>
+      <pc:sldChg chg="new del">
+        <pc:chgData name="Widyanto, Hendry" userId="7bc02913-90f9-4354-b7d8-306a7ff96a5f" providerId="ADAL" clId="{F1DF9500-FD0D-475C-AA9D-E6F4CFE884E5}" dt="2024-04-26T19:00:02.601" v="6" actId="47"/>
+        <pc:sldMkLst>
+          <pc:docMk/>
+          <pc:sldMk cId="1319575746" sldId="257"/>
+        </pc:sldMkLst>
+      </pc:sldChg>
+      <pc:sldChg chg="addSp delSp modSp add mod">
+        <pc:chgData name="Widyanto, Hendry" userId="7bc02913-90f9-4354-b7d8-306a7ff96a5f" providerId="ADAL" clId="{F1DF9500-FD0D-475C-AA9D-E6F4CFE884E5}" dt="2024-04-26T19:10:50.782" v="53" actId="1076"/>
+        <pc:sldMkLst>
+          <pc:docMk/>
+          <pc:sldMk cId="462908078" sldId="258"/>
+        </pc:sldMkLst>
+        <pc:spChg chg="mod">
+          <ac:chgData name="Widyanto, Hendry" userId="7bc02913-90f9-4354-b7d8-306a7ff96a5f" providerId="ADAL" clId="{F1DF9500-FD0D-475C-AA9D-E6F4CFE884E5}" dt="2024-04-26T19:09:56.714" v="41" actId="20577"/>
+          <ac:spMkLst>
+            <pc:docMk/>
+            <pc:sldMk cId="462908078" sldId="258"/>
+            <ac:spMk id="4" creationId="{EB1591A0-3305-CF73-8421-DBE1ECDC930F}"/>
+          </ac:spMkLst>
+        </pc:spChg>
+        <pc:spChg chg="mod">
+          <ac:chgData name="Widyanto, Hendry" userId="7bc02913-90f9-4354-b7d8-306a7ff96a5f" providerId="ADAL" clId="{F1DF9500-FD0D-475C-AA9D-E6F4CFE884E5}" dt="2024-04-26T19:10:44.458" v="49"/>
+          <ac:spMkLst>
+            <pc:docMk/>
+            <pc:sldMk cId="462908078" sldId="258"/>
+            <ac:spMk id="23" creationId="{AF7B813B-B0C8-E6A9-BA22-00F7617BD97C}"/>
+          </ac:spMkLst>
+        </pc:spChg>
+        <pc:spChg chg="mod">
+          <ac:chgData name="Widyanto, Hendry" userId="7bc02913-90f9-4354-b7d8-306a7ff96a5f" providerId="ADAL" clId="{F1DF9500-FD0D-475C-AA9D-E6F4CFE884E5}" dt="2024-04-26T19:10:44.458" v="49"/>
+          <ac:spMkLst>
+            <pc:docMk/>
+            <pc:sldMk cId="462908078" sldId="258"/>
+            <ac:spMk id="24" creationId="{252C2E3C-BBA3-EA95-A653-6674EB60C61D}"/>
+          </ac:spMkLst>
+        </pc:spChg>
+        <pc:grpChg chg="add mod">
+          <ac:chgData name="Widyanto, Hendry" userId="7bc02913-90f9-4354-b7d8-306a7ff96a5f" providerId="ADAL" clId="{F1DF9500-FD0D-475C-AA9D-E6F4CFE884E5}" dt="2024-04-26T19:10:42.722" v="48" actId="164"/>
+          <ac:grpSpMkLst>
+            <pc:docMk/>
+            <pc:sldMk cId="462908078" sldId="258"/>
+            <ac:grpSpMk id="14" creationId="{926E8E6C-AC7B-BE5E-FE1D-7765701E2349}"/>
+          </ac:grpSpMkLst>
+        </pc:grpChg>
+        <pc:grpChg chg="del">
+          <ac:chgData name="Widyanto, Hendry" userId="7bc02913-90f9-4354-b7d8-306a7ff96a5f" providerId="ADAL" clId="{F1DF9500-FD0D-475C-AA9D-E6F4CFE884E5}" dt="2024-04-26T19:10:22.459" v="44" actId="478"/>
+          <ac:grpSpMkLst>
+            <pc:docMk/>
+            <pc:sldMk cId="462908078" sldId="258"/>
+            <ac:grpSpMk id="16" creationId="{F98424CE-1C1B-AB5A-9580-B481A95CC53E}"/>
+          </ac:grpSpMkLst>
+        </pc:grpChg>
+        <pc:grpChg chg="mod">
+          <ac:chgData name="Widyanto, Hendry" userId="7bc02913-90f9-4354-b7d8-306a7ff96a5f" providerId="ADAL" clId="{F1DF9500-FD0D-475C-AA9D-E6F4CFE884E5}" dt="2024-04-26T19:10:42.722" v="48" actId="164"/>
+          <ac:grpSpMkLst>
+            <pc:docMk/>
+            <pc:sldMk cId="462908078" sldId="258"/>
+            <ac:grpSpMk id="17" creationId="{135AE315-0961-37F0-0374-E805B0E75210}"/>
+          </ac:grpSpMkLst>
+        </pc:grpChg>
+        <pc:grpChg chg="add del mod">
+          <ac:chgData name="Widyanto, Hendry" userId="7bc02913-90f9-4354-b7d8-306a7ff96a5f" providerId="ADAL" clId="{F1DF9500-FD0D-475C-AA9D-E6F4CFE884E5}" dt="2024-04-26T19:10:45.163" v="50"/>
+          <ac:grpSpMkLst>
+            <pc:docMk/>
+            <pc:sldMk cId="462908078" sldId="258"/>
+            <ac:grpSpMk id="18" creationId="{01CEA751-2CC4-189D-6752-FA279B18C78A}"/>
+          </ac:grpSpMkLst>
+        </pc:grpChg>
+        <pc:grpChg chg="mod">
+          <ac:chgData name="Widyanto, Hendry" userId="7bc02913-90f9-4354-b7d8-306a7ff96a5f" providerId="ADAL" clId="{F1DF9500-FD0D-475C-AA9D-E6F4CFE884E5}" dt="2024-04-26T19:10:44.458" v="49"/>
+          <ac:grpSpMkLst>
+            <pc:docMk/>
+            <pc:sldMk cId="462908078" sldId="258"/>
+            <ac:grpSpMk id="19" creationId="{DF558D83-D70D-0EE5-9855-07BC7FF920A0}"/>
+          </ac:grpSpMkLst>
+        </pc:grpChg>
+        <pc:picChg chg="add mod">
+          <ac:chgData name="Widyanto, Hendry" userId="7bc02913-90f9-4354-b7d8-306a7ff96a5f" providerId="ADAL" clId="{F1DF9500-FD0D-475C-AA9D-E6F4CFE884E5}" dt="2024-04-26T19:10:42.722" v="48" actId="164"/>
+          <ac:picMkLst>
+            <pc:docMk/>
+            <pc:sldMk cId="462908078" sldId="258"/>
+            <ac:picMk id="3" creationId="{7854F310-FD57-2E5F-A811-AB9E10B58C61}"/>
+          </ac:picMkLst>
+        </pc:picChg>
+        <pc:picChg chg="add mod">
+          <ac:chgData name="Widyanto, Hendry" userId="7bc02913-90f9-4354-b7d8-306a7ff96a5f" providerId="ADAL" clId="{F1DF9500-FD0D-475C-AA9D-E6F4CFE884E5}" dt="2024-04-26T19:10:42.722" v="48" actId="164"/>
+          <ac:picMkLst>
+            <pc:docMk/>
+            <pc:sldMk cId="462908078" sldId="258"/>
+            <ac:picMk id="7" creationId="{66CDDB5F-D668-3241-2CC0-7025DD51EA3C}"/>
+          </ac:picMkLst>
+        </pc:picChg>
+        <pc:picChg chg="del">
+          <ac:chgData name="Widyanto, Hendry" userId="7bc02913-90f9-4354-b7d8-306a7ff96a5f" providerId="ADAL" clId="{F1DF9500-FD0D-475C-AA9D-E6F4CFE884E5}" dt="2024-04-26T19:00:38.024" v="10" actId="478"/>
+          <ac:picMkLst>
+            <pc:docMk/>
+            <pc:sldMk cId="462908078" sldId="258"/>
+            <ac:picMk id="8" creationId="{DE675CEE-F552-59C9-7E98-7FAD45ADAE32}"/>
+          </ac:picMkLst>
+        </pc:picChg>
+        <pc:picChg chg="del">
+          <ac:chgData name="Widyanto, Hendry" userId="7bc02913-90f9-4354-b7d8-306a7ff96a5f" providerId="ADAL" clId="{F1DF9500-FD0D-475C-AA9D-E6F4CFE884E5}" dt="2024-04-26T19:09:34.953" v="15" actId="478"/>
+          <ac:picMkLst>
+            <pc:docMk/>
+            <pc:sldMk cId="462908078" sldId="258"/>
+            <ac:picMk id="10" creationId="{7BD70AA4-7E62-668A-CA5B-70902EFA8082}"/>
+          </ac:picMkLst>
+        </pc:picChg>
+        <pc:picChg chg="add mod">
+          <ac:chgData name="Widyanto, Hendry" userId="7bc02913-90f9-4354-b7d8-306a7ff96a5f" providerId="ADAL" clId="{F1DF9500-FD0D-475C-AA9D-E6F4CFE884E5}" dt="2024-04-26T19:10:42.722" v="48" actId="164"/>
+          <ac:picMkLst>
+            <pc:docMk/>
+            <pc:sldMk cId="462908078" sldId="258"/>
+            <ac:picMk id="11" creationId="{3F7B327E-807F-8C9E-CD0A-231AB7F3F872}"/>
+          </ac:picMkLst>
+        </pc:picChg>
+        <pc:picChg chg="del">
+          <ac:chgData name="Widyanto, Hendry" userId="7bc02913-90f9-4354-b7d8-306a7ff96a5f" providerId="ADAL" clId="{F1DF9500-FD0D-475C-AA9D-E6F4CFE884E5}" dt="2024-04-26T19:10:22.459" v="44" actId="478"/>
+          <ac:picMkLst>
+            <pc:docMk/>
+            <pc:sldMk cId="462908078" sldId="258"/>
+            <ac:picMk id="12" creationId="{82C4F30F-8263-C91D-FAB5-15A91A82DAB7}"/>
+          </ac:picMkLst>
+        </pc:picChg>
+        <pc:picChg chg="add del">
+          <ac:chgData name="Widyanto, Hendry" userId="7bc02913-90f9-4354-b7d8-306a7ff96a5f" providerId="ADAL" clId="{F1DF9500-FD0D-475C-AA9D-E6F4CFE884E5}" dt="2024-04-26T19:10:35.115" v="47"/>
+          <ac:picMkLst>
+            <pc:docMk/>
+            <pc:sldMk cId="462908078" sldId="258"/>
+            <ac:picMk id="13" creationId="{4E6D8157-266A-827F-0D01-B618831DD1C5}"/>
+          </ac:picMkLst>
+        </pc:picChg>
+        <pc:picChg chg="mod">
+          <ac:chgData name="Widyanto, Hendry" userId="7bc02913-90f9-4354-b7d8-306a7ff96a5f" providerId="ADAL" clId="{F1DF9500-FD0D-475C-AA9D-E6F4CFE884E5}" dt="2024-04-26T19:10:44.458" v="49"/>
+          <ac:picMkLst>
+            <pc:docMk/>
+            <pc:sldMk cId="462908078" sldId="258"/>
+            <ac:picMk id="20" creationId="{83DC2191-57DD-B511-008F-0152982D3AF8}"/>
+          </ac:picMkLst>
+        </pc:picChg>
+        <pc:picChg chg="mod">
+          <ac:chgData name="Widyanto, Hendry" userId="7bc02913-90f9-4354-b7d8-306a7ff96a5f" providerId="ADAL" clId="{F1DF9500-FD0D-475C-AA9D-E6F4CFE884E5}" dt="2024-04-26T19:10:44.458" v="49"/>
+          <ac:picMkLst>
+            <pc:docMk/>
+            <pc:sldMk cId="462908078" sldId="258"/>
+            <ac:picMk id="21" creationId="{D3CF7A04-442F-36D4-F525-35333BF3B72E}"/>
+          </ac:picMkLst>
+        </pc:picChg>
+        <pc:picChg chg="mod">
+          <ac:chgData name="Widyanto, Hendry" userId="7bc02913-90f9-4354-b7d8-306a7ff96a5f" providerId="ADAL" clId="{F1DF9500-FD0D-475C-AA9D-E6F4CFE884E5}" dt="2024-04-26T19:10:44.458" v="49"/>
+          <ac:picMkLst>
+            <pc:docMk/>
+            <pc:sldMk cId="462908078" sldId="258"/>
+            <ac:picMk id="22" creationId="{735822B3-D2ED-FD3B-3EF0-BD4D942888C0}"/>
+          </ac:picMkLst>
+        </pc:picChg>
+        <pc:picChg chg="mod">
+          <ac:chgData name="Widyanto, Hendry" userId="7bc02913-90f9-4354-b7d8-306a7ff96a5f" providerId="ADAL" clId="{F1DF9500-FD0D-475C-AA9D-E6F4CFE884E5}" dt="2024-04-26T19:10:44.458" v="49"/>
+          <ac:picMkLst>
+            <pc:docMk/>
+            <pc:sldMk cId="462908078" sldId="258"/>
+            <ac:picMk id="25" creationId="{6B8E3A63-5B17-5B13-4943-6354368E83F0}"/>
+          </ac:picMkLst>
+        </pc:picChg>
+        <pc:picChg chg="add mod">
+          <ac:chgData name="Widyanto, Hendry" userId="7bc02913-90f9-4354-b7d8-306a7ff96a5f" providerId="ADAL" clId="{F1DF9500-FD0D-475C-AA9D-E6F4CFE884E5}" dt="2024-04-26T19:10:50.782" v="53" actId="1076"/>
+          <ac:picMkLst>
+            <pc:docMk/>
+            <pc:sldMk cId="462908078" sldId="258"/>
+            <ac:picMk id="26" creationId="{8ACD09D2-DA52-A89D-5435-80386D0AB0A1}"/>
+          </ac:picMkLst>
+        </pc:picChg>
+        <pc:picChg chg="del">
+          <ac:chgData name="Widyanto, Hendry" userId="7bc02913-90f9-4354-b7d8-306a7ff96a5f" providerId="ADAL" clId="{F1DF9500-FD0D-475C-AA9D-E6F4CFE884E5}" dt="2024-04-26T19:00:04.558" v="7" actId="478"/>
+          <ac:picMkLst>
+            <pc:docMk/>
+            <pc:sldMk cId="462908078" sldId="258"/>
+            <ac:picMk id="27" creationId="{5E9C174F-941F-0ABA-7B4D-02C1B089B704}"/>
+          </ac:picMkLst>
+        </pc:picChg>
+      </pc:sldChg>
+    </pc:docChg>
+  </pc:docChgLst>
+</pc:chgInfo>
 </file>
 
 <file path=ppt/slideLayouts/slideLayout1.xml><?xml version="1.0" encoding="utf-8"?>
@@ -254,7 +479,7 @@
           <a:p>
             <a:fld id="{88753360-3CCB-443A-AC98-79014B019620}" type="datetimeFigureOut">
               <a:rPr lang="en-US" smtClean="0"/>
-              <a:t>4/23/2024</a:t>
+              <a:t>4/26/2024</a:t>
             </a:fld>
             <a:endParaRPr lang="en-US"/>
           </a:p>
@@ -452,7 +677,7 @@
           <a:p>
             <a:fld id="{88753360-3CCB-443A-AC98-79014B019620}" type="datetimeFigureOut">
               <a:rPr lang="en-US" smtClean="0"/>
-              <a:t>4/23/2024</a:t>
+              <a:t>4/26/2024</a:t>
             </a:fld>
             <a:endParaRPr lang="en-US"/>
           </a:p>
@@ -660,7 +885,7 @@
           <a:p>
             <a:fld id="{88753360-3CCB-443A-AC98-79014B019620}" type="datetimeFigureOut">
               <a:rPr lang="en-US" smtClean="0"/>
-              <a:t>4/23/2024</a:t>
+              <a:t>4/26/2024</a:t>
             </a:fld>
             <a:endParaRPr lang="en-US"/>
           </a:p>
@@ -858,7 +1083,7 @@
           <a:p>
             <a:fld id="{88753360-3CCB-443A-AC98-79014B019620}" type="datetimeFigureOut">
               <a:rPr lang="en-US" smtClean="0"/>
-              <a:t>4/23/2024</a:t>
+              <a:t>4/26/2024</a:t>
             </a:fld>
             <a:endParaRPr lang="en-US"/>
           </a:p>
@@ -1133,7 +1358,7 @@
           <a:p>
             <a:fld id="{88753360-3CCB-443A-AC98-79014B019620}" type="datetimeFigureOut">
               <a:rPr lang="en-US" smtClean="0"/>
-              <a:t>4/23/2024</a:t>
+              <a:t>4/26/2024</a:t>
             </a:fld>
             <a:endParaRPr lang="en-US"/>
           </a:p>
@@ -1398,7 +1623,7 @@
           <a:p>
             <a:fld id="{88753360-3CCB-443A-AC98-79014B019620}" type="datetimeFigureOut">
               <a:rPr lang="en-US" smtClean="0"/>
-              <a:t>4/23/2024</a:t>
+              <a:t>4/26/2024</a:t>
             </a:fld>
             <a:endParaRPr lang="en-US"/>
           </a:p>
@@ -1810,7 +2035,7 @@
           <a:p>
             <a:fld id="{88753360-3CCB-443A-AC98-79014B019620}" type="datetimeFigureOut">
               <a:rPr lang="en-US" smtClean="0"/>
-              <a:t>4/23/2024</a:t>
+              <a:t>4/26/2024</a:t>
             </a:fld>
             <a:endParaRPr lang="en-US"/>
           </a:p>
@@ -1951,7 +2176,7 @@
           <a:p>
             <a:fld id="{88753360-3CCB-443A-AC98-79014B019620}" type="datetimeFigureOut">
               <a:rPr lang="en-US" smtClean="0"/>
-              <a:t>4/23/2024</a:t>
+              <a:t>4/26/2024</a:t>
             </a:fld>
             <a:endParaRPr lang="en-US"/>
           </a:p>
@@ -2064,7 +2289,7 @@
           <a:p>
             <a:fld id="{88753360-3CCB-443A-AC98-79014B019620}" type="datetimeFigureOut">
               <a:rPr lang="en-US" smtClean="0"/>
-              <a:t>4/23/2024</a:t>
+              <a:t>4/26/2024</a:t>
             </a:fld>
             <a:endParaRPr lang="en-US"/>
           </a:p>
@@ -2375,7 +2600,7 @@
           <a:p>
             <a:fld id="{88753360-3CCB-443A-AC98-79014B019620}" type="datetimeFigureOut">
               <a:rPr lang="en-US" smtClean="0"/>
-              <a:t>4/23/2024</a:t>
+              <a:t>4/26/2024</a:t>
             </a:fld>
             <a:endParaRPr lang="en-US"/>
           </a:p>
@@ -2663,7 +2888,7 @@
           <a:p>
             <a:fld id="{88753360-3CCB-443A-AC98-79014B019620}" type="datetimeFigureOut">
               <a:rPr lang="en-US" smtClean="0"/>
-              <a:t>4/23/2024</a:t>
+              <a:t>4/26/2024</a:t>
             </a:fld>
             <a:endParaRPr lang="en-US"/>
           </a:p>
@@ -2904,7 +3129,7 @@
           <a:p>
             <a:fld id="{88753360-3CCB-443A-AC98-79014B019620}" type="datetimeFigureOut">
               <a:rPr lang="en-US" smtClean="0"/>
-              <a:t>4/23/2024</a:t>
+              <a:t>4/26/2024</a:t>
             </a:fld>
             <a:endParaRPr lang="en-US"/>
           </a:p>
@@ -3644,8 +3869,8 @@
         </p:blipFill>
         <p:spPr>
           <a:xfrm>
-            <a:off x="-262894" y="172719"/>
-            <a:ext cx="6858000" cy="6858000"/>
+            <a:off x="866786" y="1694329"/>
+            <a:ext cx="3729318" cy="3729318"/>
           </a:xfrm>
           <a:prstGeom prst="rect">
             <a:avLst/>
@@ -3656,6 +3881,379 @@
     <p:extLst>
       <p:ext uri="{BB962C8B-B14F-4D97-AF65-F5344CB8AC3E}">
         <p14:creationId xmlns:p14="http://schemas.microsoft.com/office/powerpoint/2010/main" val="4102408768"/>
+      </p:ext>
+    </p:extLst>
+  </p:cSld>
+  <p:clrMapOvr>
+    <a:masterClrMapping/>
+  </p:clrMapOvr>
+</p:sld>
+</file>
+
+<file path=ppt/slides/slide2.xml><?xml version="1.0" encoding="utf-8"?>
+<p:sld xmlns:a="http://schemas.openxmlformats.org/drawingml/2006/main" xmlns:r="http://schemas.openxmlformats.org/officeDocument/2006/relationships" xmlns:p="http://schemas.openxmlformats.org/presentationml/2006/main">
+  <p:cSld>
+    <p:spTree>
+      <p:nvGrpSpPr>
+        <p:cNvPr id="1" name=""/>
+        <p:cNvGrpSpPr/>
+        <p:nvPr/>
+      </p:nvGrpSpPr>
+      <p:grpSpPr>
+        <a:xfrm>
+          <a:off x="0" y="0"/>
+          <a:ext cx="0" cy="0"/>
+          <a:chOff x="0" y="0"/>
+          <a:chExt cx="0" cy="0"/>
+        </a:xfrm>
+      </p:grpSpPr>
+      <p:grpSp>
+        <p:nvGrpSpPr>
+          <p:cNvPr id="14" name="Group 13">
+            <a:extLst>
+              <a:ext uri="{FF2B5EF4-FFF2-40B4-BE49-F238E27FC236}">
+                <a16:creationId xmlns:a16="http://schemas.microsoft.com/office/drawing/2014/main" id="{926E8E6C-AC7B-BE5E-FE1D-7765701E2349}"/>
+              </a:ext>
+            </a:extLst>
+          </p:cNvPr>
+          <p:cNvGrpSpPr/>
+          <p:nvPr/>
+        </p:nvGrpSpPr>
+        <p:grpSpPr>
+          <a:xfrm>
+            <a:off x="4966464" y="0"/>
+            <a:ext cx="6858000" cy="6857999"/>
+            <a:chOff x="4966464" y="0"/>
+            <a:chExt cx="6858000" cy="6857999"/>
+          </a:xfrm>
+        </p:grpSpPr>
+        <p:grpSp>
+          <p:nvGrpSpPr>
+            <p:cNvPr id="17" name="Group 16">
+              <a:extLst>
+                <a:ext uri="{FF2B5EF4-FFF2-40B4-BE49-F238E27FC236}">
+                  <a16:creationId xmlns:a16="http://schemas.microsoft.com/office/drawing/2014/main" id="{135AE315-0961-37F0-0374-E805B0E75210}"/>
+                </a:ext>
+              </a:extLst>
+            </p:cNvPr>
+            <p:cNvGrpSpPr/>
+            <p:nvPr/>
+          </p:nvGrpSpPr>
+          <p:grpSpPr>
+            <a:xfrm>
+              <a:off x="4966464" y="0"/>
+              <a:ext cx="6858000" cy="6857999"/>
+              <a:chOff x="2528064" y="1"/>
+              <a:chExt cx="6858000" cy="6857999"/>
+            </a:xfrm>
+          </p:grpSpPr>
+          <p:sp>
+            <p:nvSpPr>
+              <p:cNvPr id="15" name="Rectangle 14">
+                <a:extLst>
+                  <a:ext uri="{FF2B5EF4-FFF2-40B4-BE49-F238E27FC236}">
+                    <a16:creationId xmlns:a16="http://schemas.microsoft.com/office/drawing/2014/main" id="{0752FDD1-5D51-B536-E25D-C30B771FE623}"/>
+                  </a:ext>
+                </a:extLst>
+              </p:cNvPr>
+              <p:cNvSpPr/>
+              <p:nvPr/>
+            </p:nvSpPr>
+            <p:spPr>
+              <a:xfrm>
+                <a:off x="2528065" y="1"/>
+                <a:ext cx="6857999" cy="6857999"/>
+              </a:xfrm>
+              <a:prstGeom prst="rect">
+                <a:avLst/>
+              </a:prstGeom>
+              <a:ln>
+                <a:noFill/>
+              </a:ln>
+            </p:spPr>
+            <p:style>
+              <a:lnRef idx="2">
+                <a:schemeClr val="dk1"/>
+              </a:lnRef>
+              <a:fillRef idx="1">
+                <a:schemeClr val="lt1"/>
+              </a:fillRef>
+              <a:effectRef idx="0">
+                <a:schemeClr val="dk1"/>
+              </a:effectRef>
+              <a:fontRef idx="minor">
+                <a:schemeClr val="dk1"/>
+              </a:fontRef>
+            </p:style>
+            <p:txBody>
+              <a:bodyPr rtlCol="0" anchor="ctr"/>
+              <a:lstStyle/>
+              <a:p>
+                <a:pPr algn="ctr"/>
+                <a:endParaRPr lang="en-US" sz="8800" b="1" dirty="0"/>
+              </a:p>
+            </p:txBody>
+          </p:sp>
+          <p:sp>
+            <p:nvSpPr>
+              <p:cNvPr id="4" name="Rectangle 3">
+                <a:extLst>
+                  <a:ext uri="{FF2B5EF4-FFF2-40B4-BE49-F238E27FC236}">
+                    <a16:creationId xmlns:a16="http://schemas.microsoft.com/office/drawing/2014/main" id="{EB1591A0-3305-CF73-8421-DBE1ECDC930F}"/>
+                  </a:ext>
+                </a:extLst>
+              </p:cNvPr>
+              <p:cNvSpPr/>
+              <p:nvPr/>
+            </p:nvSpPr>
+            <p:spPr>
+              <a:xfrm>
+                <a:off x="2528064" y="2092960"/>
+                <a:ext cx="6857999" cy="3423918"/>
+              </a:xfrm>
+              <a:prstGeom prst="rect">
+                <a:avLst/>
+              </a:prstGeom>
+              <a:noFill/>
+              <a:ln>
+                <a:noFill/>
+              </a:ln>
+            </p:spPr>
+            <p:style>
+              <a:lnRef idx="2">
+                <a:schemeClr val="dk1"/>
+              </a:lnRef>
+              <a:fillRef idx="1">
+                <a:schemeClr val="lt1"/>
+              </a:fillRef>
+              <a:effectRef idx="0">
+                <a:schemeClr val="dk1"/>
+              </a:effectRef>
+              <a:fontRef idx="minor">
+                <a:schemeClr val="dk1"/>
+              </a:fontRef>
+            </p:style>
+            <p:txBody>
+              <a:bodyPr rtlCol="0" anchor="ctr"/>
+              <a:lstStyle/>
+              <a:p>
+                <a:pPr algn="ctr"/>
+                <a:r>
+                  <a:rPr lang="en-US" sz="8800" b="1" dirty="0">
+                    <a:solidFill>
+                      <a:srgbClr val="2563EB"/>
+                    </a:solidFill>
+                    <a:latin typeface="Agency FB" panose="020B0503020202020204" pitchFamily="34" charset="0"/>
+                  </a:rPr>
+                  <a:t>WEBSITE</a:t>
+                </a:r>
+              </a:p>
+              <a:p>
+                <a:pPr algn="ctr"/>
+                <a:r>
+                  <a:rPr lang="en-US" sz="8800" b="1" dirty="0">
+                    <a:solidFill>
+                      <a:srgbClr val="2563EB"/>
+                    </a:solidFill>
+                    <a:latin typeface="Agency FB" panose="020B0503020202020204" pitchFamily="34" charset="0"/>
+                  </a:rPr>
+                  <a:t>ANALYTICS</a:t>
+                </a:r>
+              </a:p>
+            </p:txBody>
+          </p:sp>
+          <p:pic>
+            <p:nvPicPr>
+              <p:cNvPr id="6" name="Graphic 5" descr="Database with solid fill">
+                <a:extLst>
+                  <a:ext uri="{FF2B5EF4-FFF2-40B4-BE49-F238E27FC236}">
+                    <a16:creationId xmlns:a16="http://schemas.microsoft.com/office/drawing/2014/main" id="{A2E606B0-0906-549C-D559-B221E9ECF382}"/>
+                  </a:ext>
+                </a:extLst>
+              </p:cNvPr>
+              <p:cNvPicPr>
+                <a:picLocks noChangeAspect="1"/>
+              </p:cNvPicPr>
+              <p:nvPr/>
+            </p:nvPicPr>
+            <p:blipFill>
+              <a:blip r:embed="rId2">
+                <a:extLst>
+                  <a:ext uri="{28A0092B-C50C-407E-A947-70E740481C1C}">
+                    <a14:useLocalDpi xmlns:a14="http://schemas.microsoft.com/office/drawing/2010/main" val="0"/>
+                  </a:ext>
+                  <a:ext uri="{96DAC541-7B7A-43D3-8B79-37D633B846F1}">
+                    <asvg:svgBlip xmlns:asvg="http://schemas.microsoft.com/office/drawing/2016/SVG/main" r:embed="rId3"/>
+                  </a:ext>
+                </a:extLst>
+              </a:blip>
+              <a:stretch>
+                <a:fillRect/>
+              </a:stretch>
+            </p:blipFill>
+            <p:spPr>
+              <a:xfrm>
+                <a:off x="3586189" y="1341122"/>
+                <a:ext cx="914400" cy="914400"/>
+              </a:xfrm>
+              <a:prstGeom prst="rect">
+                <a:avLst/>
+              </a:prstGeom>
+            </p:spPr>
+          </p:pic>
+        </p:grpSp>
+        <p:pic>
+          <p:nvPicPr>
+            <p:cNvPr id="3" name="Graphic 2" descr="Web design with solid fill">
+              <a:extLst>
+                <a:ext uri="{FF2B5EF4-FFF2-40B4-BE49-F238E27FC236}">
+                  <a16:creationId xmlns:a16="http://schemas.microsoft.com/office/drawing/2014/main" id="{7854F310-FD57-2E5F-A811-AB9E10B58C61}"/>
+                </a:ext>
+              </a:extLst>
+            </p:cNvPr>
+            <p:cNvPicPr>
+              <a:picLocks noChangeAspect="1"/>
+            </p:cNvPicPr>
+            <p:nvPr/>
+          </p:nvPicPr>
+          <p:blipFill>
+            <a:blip r:embed="rId4">
+              <a:extLst>
+                <a:ext uri="{28A0092B-C50C-407E-A947-70E740481C1C}">
+                  <a14:useLocalDpi xmlns:a14="http://schemas.microsoft.com/office/drawing/2010/main" val="0"/>
+                </a:ext>
+                <a:ext uri="{96DAC541-7B7A-43D3-8B79-37D633B846F1}">
+                  <asvg:svgBlip xmlns:asvg="http://schemas.microsoft.com/office/drawing/2016/SVG/main" r:embed="rId5"/>
+                </a:ext>
+              </a:extLst>
+            </a:blip>
+            <a:stretch>
+              <a:fillRect/>
+            </a:stretch>
+          </p:blipFill>
+          <p:spPr>
+            <a:xfrm>
+              <a:off x="7309349" y="1341121"/>
+              <a:ext cx="914400" cy="914400"/>
+            </a:xfrm>
+            <a:prstGeom prst="rect">
+              <a:avLst/>
+            </a:prstGeom>
+          </p:spPr>
+        </p:pic>
+        <p:pic>
+          <p:nvPicPr>
+            <p:cNvPr id="7" name="Graphic 6" descr="North America with solid fill">
+              <a:extLst>
+                <a:ext uri="{FF2B5EF4-FFF2-40B4-BE49-F238E27FC236}">
+                  <a16:creationId xmlns:a16="http://schemas.microsoft.com/office/drawing/2014/main" id="{66CDDB5F-D668-3241-2CC0-7025DD51EA3C}"/>
+                </a:ext>
+              </a:extLst>
+            </p:cNvPr>
+            <p:cNvPicPr>
+              <a:picLocks noChangeAspect="1"/>
+            </p:cNvPicPr>
+            <p:nvPr/>
+          </p:nvPicPr>
+          <p:blipFill>
+            <a:blip r:embed="rId6">
+              <a:extLst>
+                <a:ext uri="{28A0092B-C50C-407E-A947-70E740481C1C}">
+                  <a14:useLocalDpi xmlns:a14="http://schemas.microsoft.com/office/drawing/2010/main" val="0"/>
+                </a:ext>
+                <a:ext uri="{96DAC541-7B7A-43D3-8B79-37D633B846F1}">
+                  <asvg:svgBlip xmlns:asvg="http://schemas.microsoft.com/office/drawing/2016/SVG/main" r:embed="rId7"/>
+                </a:ext>
+              </a:extLst>
+            </a:blip>
+            <a:stretch>
+              <a:fillRect/>
+            </a:stretch>
+          </p:blipFill>
+          <p:spPr>
+            <a:xfrm>
+              <a:off x="8558250" y="1341121"/>
+              <a:ext cx="914400" cy="914400"/>
+            </a:xfrm>
+            <a:prstGeom prst="rect">
+              <a:avLst/>
+            </a:prstGeom>
+          </p:spPr>
+        </p:pic>
+        <p:pic>
+          <p:nvPicPr>
+            <p:cNvPr id="11" name="Graphic 10" descr="Storytelling with solid fill">
+              <a:extLst>
+                <a:ext uri="{FF2B5EF4-FFF2-40B4-BE49-F238E27FC236}">
+                  <a16:creationId xmlns:a16="http://schemas.microsoft.com/office/drawing/2014/main" id="{3F7B327E-807F-8C9E-CD0A-231AB7F3F872}"/>
+                </a:ext>
+              </a:extLst>
+            </p:cNvPr>
+            <p:cNvPicPr>
+              <a:picLocks noChangeAspect="1"/>
+            </p:cNvPicPr>
+            <p:nvPr/>
+          </p:nvPicPr>
+          <p:blipFill>
+            <a:blip r:embed="rId8">
+              <a:extLst>
+                <a:ext uri="{28A0092B-C50C-407E-A947-70E740481C1C}">
+                  <a14:useLocalDpi xmlns:a14="http://schemas.microsoft.com/office/drawing/2010/main" val="0"/>
+                </a:ext>
+                <a:ext uri="{96DAC541-7B7A-43D3-8B79-37D633B846F1}">
+                  <asvg:svgBlip xmlns:asvg="http://schemas.microsoft.com/office/drawing/2016/SVG/main" r:embed="rId9"/>
+                </a:ext>
+              </a:extLst>
+            </a:blip>
+            <a:stretch>
+              <a:fillRect/>
+            </a:stretch>
+          </p:blipFill>
+          <p:spPr>
+            <a:xfrm>
+              <a:off x="9807151" y="1288529"/>
+              <a:ext cx="914400" cy="914400"/>
+            </a:xfrm>
+            <a:prstGeom prst="rect">
+              <a:avLst/>
+            </a:prstGeom>
+          </p:spPr>
+        </p:pic>
+      </p:grpSp>
+      <p:pic>
+        <p:nvPicPr>
+          <p:cNvPr id="26" name="Picture 25">
+            <a:extLst>
+              <a:ext uri="{FF2B5EF4-FFF2-40B4-BE49-F238E27FC236}">
+                <a16:creationId xmlns:a16="http://schemas.microsoft.com/office/drawing/2014/main" id="{8ACD09D2-DA52-A89D-5435-80386D0AB0A1}"/>
+              </a:ext>
+            </a:extLst>
+          </p:cNvPr>
+          <p:cNvPicPr>
+            <a:picLocks noChangeAspect="1"/>
+          </p:cNvPicPr>
+          <p:nvPr/>
+        </p:nvPicPr>
+        <p:blipFill>
+          <a:blip r:embed="rId10"/>
+          <a:stretch>
+            <a:fillRect/>
+          </a:stretch>
+        </p:blipFill>
+        <p:spPr>
+          <a:xfrm>
+            <a:off x="1001164" y="1174000"/>
+            <a:ext cx="3798049" cy="3798049"/>
+          </a:xfrm>
+          <a:prstGeom prst="rect">
+            <a:avLst/>
+          </a:prstGeom>
+        </p:spPr>
+      </p:pic>
+    </p:spTree>
+    <p:extLst>
+      <p:ext uri="{BB962C8B-B14F-4D97-AF65-F5344CB8AC3E}">
+        <p14:creationId xmlns:p14="http://schemas.microsoft.com/office/powerpoint/2010/main" val="462908078"/>
       </p:ext>
     </p:extLst>
   </p:cSld>

</xml_diff>